<commit_message>
shorter lines for ruby spec
</commit_message>
<xml_diff>
--- a/Functional_OO.pptx
+++ b/Functional_OO.pptx
@@ -6166,12 +6166,18 @@
         </p:nvSpPr>
         <p:spPr/>
         <p:txBody>
-          <a:bodyPr/>
-          <a:lstStyle/>
-          <a:p>
+          <a:bodyPr>
+            <a:normAutofit fontScale="90000"/>
+          </a:bodyPr>
+          <a:lstStyle/>
+          <a:p>
+            <a:r>
+              <a:rPr lang="en-US" dirty="0"/>
+              <a:t>Partial Application / CURRYING / </a:t>
+            </a:r>
             <a:r>
               <a:rPr lang="en-US" dirty="0" smtClean="0"/>
-              <a:t>Function composition</a:t>
+              <a:t>Function Composition</a:t>
             </a:r>
             <a:endParaRPr lang="en-US" dirty="0"/>
           </a:p>
@@ -8463,6 +8469,66 @@
           </a:p>
         </p:txBody>
       </p:sp>
+      <p:pic>
+        <p:nvPicPr>
+          <p:cNvPr id="4" name="Picture 3"/>
+          <p:cNvPicPr>
+            <a:picLocks noChangeAspect="1"/>
+          </p:cNvPicPr>
+          <p:nvPr/>
+        </p:nvPicPr>
+        <p:blipFill>
+          <a:blip r:embed="rId2">
+            <a:extLst>
+              <a:ext uri="{28A0092B-C50C-407E-A947-70E740481C1C}">
+                <a14:useLocalDpi xmlns:a14="http://schemas.microsoft.com/office/drawing/2010/main" val="0"/>
+              </a:ext>
+            </a:extLst>
+          </a:blip>
+          <a:stretch>
+            <a:fillRect/>
+          </a:stretch>
+        </p:blipFill>
+        <p:spPr>
+          <a:xfrm>
+            <a:off x="788165" y="1619480"/>
+            <a:ext cx="4648840" cy="3916190"/>
+          </a:xfrm>
+          <a:prstGeom prst="rect">
+            <a:avLst/>
+          </a:prstGeom>
+        </p:spPr>
+      </p:pic>
+      <p:pic>
+        <p:nvPicPr>
+          <p:cNvPr id="6" name="Picture 5"/>
+          <p:cNvPicPr>
+            <a:picLocks noChangeAspect="1"/>
+          </p:cNvPicPr>
+          <p:nvPr/>
+        </p:nvPicPr>
+        <p:blipFill>
+          <a:blip r:embed="rId3">
+            <a:extLst>
+              <a:ext uri="{28A0092B-C50C-407E-A947-70E740481C1C}">
+                <a14:useLocalDpi xmlns:a14="http://schemas.microsoft.com/office/drawing/2010/main" val="0"/>
+              </a:ext>
+            </a:extLst>
+          </a:blip>
+          <a:stretch>
+            <a:fillRect/>
+          </a:stretch>
+        </p:blipFill>
+        <p:spPr>
+          <a:xfrm>
+            <a:off x="6103344" y="1619480"/>
+            <a:ext cx="4469111" cy="2569070"/>
+          </a:xfrm>
+          <a:prstGeom prst="rect">
+            <a:avLst/>
+          </a:prstGeom>
+        </p:spPr>
+      </p:pic>
     </p:spTree>
     <p:extLst>
       <p:ext uri="{BB962C8B-B14F-4D97-AF65-F5344CB8AC3E}">
@@ -8505,40 +8571,83 @@
         </p:nvSpPr>
         <p:spPr/>
         <p:txBody>
-          <a:bodyPr/>
+          <a:bodyPr>
+            <a:normAutofit fontScale="90000"/>
+          </a:bodyPr>
           <a:lstStyle/>
           <a:p>
             <a:r>
               <a:rPr lang="en-US" dirty="0" smtClean="0"/>
-              <a:t>Partial Application / CURRYING</a:t>
-            </a:r>
-            <a:endParaRPr lang="en-US" dirty="0"/>
-          </a:p>
-        </p:txBody>
-      </p:sp>
-      <p:sp>
-        <p:nvSpPr>
-          <p:cNvPr id="3" name="Content Placeholder 2"/>
-          <p:cNvSpPr>
-            <a:spLocks noGrp="1"/>
-          </p:cNvSpPr>
-          <p:nvPr>
-            <p:ph sz="quarter" idx="13"/>
-          </p:nvPr>
-        </p:nvSpPr>
-        <p:spPr/>
-        <p:txBody>
-          <a:bodyPr/>
-          <a:lstStyle/>
-          <a:p>
+              <a:t>Partial Application / </a:t>
+            </a:r>
             <a:r>
               <a:rPr lang="en-US" dirty="0" smtClean="0"/>
-              <a:t>Ruby</a:t>
-            </a:r>
-            <a:endParaRPr lang="en-US" dirty="0"/>
-          </a:p>
-        </p:txBody>
-      </p:sp>
+              <a:t>CURRYING / Function Composition</a:t>
+            </a:r>
+            <a:endParaRPr lang="en-US" dirty="0"/>
+          </a:p>
+        </p:txBody>
+      </p:sp>
+      <p:pic>
+        <p:nvPicPr>
+          <p:cNvPr id="4" name="Picture 3"/>
+          <p:cNvPicPr>
+            <a:picLocks noChangeAspect="1"/>
+          </p:cNvPicPr>
+          <p:nvPr/>
+        </p:nvPicPr>
+        <p:blipFill>
+          <a:blip r:embed="rId2">
+            <a:extLst>
+              <a:ext uri="{28A0092B-C50C-407E-A947-70E740481C1C}">
+                <a14:useLocalDpi xmlns:a14="http://schemas.microsoft.com/office/drawing/2010/main" val="0"/>
+              </a:ext>
+            </a:extLst>
+          </a:blip>
+          <a:stretch>
+            <a:fillRect/>
+          </a:stretch>
+        </p:blipFill>
+        <p:spPr>
+          <a:xfrm>
+            <a:off x="5442332" y="1924430"/>
+            <a:ext cx="3765308" cy="2595587"/>
+          </a:xfrm>
+          <a:prstGeom prst="rect">
+            <a:avLst/>
+          </a:prstGeom>
+        </p:spPr>
+      </p:pic>
+      <p:pic>
+        <p:nvPicPr>
+          <p:cNvPr id="5" name="Picture 4"/>
+          <p:cNvPicPr>
+            <a:picLocks noChangeAspect="1"/>
+          </p:cNvPicPr>
+          <p:nvPr/>
+        </p:nvPicPr>
+        <p:blipFill>
+          <a:blip r:embed="rId3">
+            <a:extLst>
+              <a:ext uri="{28A0092B-C50C-407E-A947-70E740481C1C}">
+                <a14:useLocalDpi xmlns:a14="http://schemas.microsoft.com/office/drawing/2010/main" val="0"/>
+              </a:ext>
+            </a:extLst>
+          </a:blip>
+          <a:stretch>
+            <a:fillRect/>
+          </a:stretch>
+        </p:blipFill>
+        <p:spPr>
+          <a:xfrm>
+            <a:off x="1049356" y="1924430"/>
+            <a:ext cx="3787049" cy="3655250"/>
+          </a:xfrm>
+          <a:prstGeom prst="rect">
+            <a:avLst/>
+          </a:prstGeom>
+        </p:spPr>
+      </p:pic>
     </p:spTree>
     <p:extLst>
       <p:ext uri="{BB962C8B-B14F-4D97-AF65-F5344CB8AC3E}">

</xml_diff>